<commit_message>
Added stock price sample
</commit_message>
<xml_diff>
--- a/assets/promo-pic-slide.pptx
+++ b/assets/promo-pic-slide.pptx
@@ -243,7 +243,7 @@
           <a:p>
             <a:fld id="{3AEECB1E-8F43-4310-8D22-D4EEFFC640B9}" type="datetimeFigureOut">
               <a:rPr lang="en-FI" smtClean="0"/>
-              <a:t>09/05/2022</a:t>
+              <a:t>03/24/2024</a:t>
             </a:fld>
             <a:endParaRPr lang="en-FI"/>
           </a:p>
@@ -413,7 +413,7 @@
           <a:p>
             <a:fld id="{3AEECB1E-8F43-4310-8D22-D4EEFFC640B9}" type="datetimeFigureOut">
               <a:rPr lang="en-FI" smtClean="0"/>
-              <a:t>09/05/2022</a:t>
+              <a:t>03/24/2024</a:t>
             </a:fld>
             <a:endParaRPr lang="en-FI"/>
           </a:p>
@@ -593,7 +593,7 @@
           <a:p>
             <a:fld id="{3AEECB1E-8F43-4310-8D22-D4EEFFC640B9}" type="datetimeFigureOut">
               <a:rPr lang="en-FI" smtClean="0"/>
-              <a:t>09/05/2022</a:t>
+              <a:t>03/24/2024</a:t>
             </a:fld>
             <a:endParaRPr lang="en-FI"/>
           </a:p>
@@ -763,7 +763,7 @@
           <a:p>
             <a:fld id="{3AEECB1E-8F43-4310-8D22-D4EEFFC640B9}" type="datetimeFigureOut">
               <a:rPr lang="en-FI" smtClean="0"/>
-              <a:t>09/05/2022</a:t>
+              <a:t>03/24/2024</a:t>
             </a:fld>
             <a:endParaRPr lang="en-FI"/>
           </a:p>
@@ -1007,7 +1007,7 @@
           <a:p>
             <a:fld id="{3AEECB1E-8F43-4310-8D22-D4EEFFC640B9}" type="datetimeFigureOut">
               <a:rPr lang="en-FI" smtClean="0"/>
-              <a:t>09/05/2022</a:t>
+              <a:t>03/24/2024</a:t>
             </a:fld>
             <a:endParaRPr lang="en-FI"/>
           </a:p>
@@ -1239,7 +1239,7 @@
           <a:p>
             <a:fld id="{3AEECB1E-8F43-4310-8D22-D4EEFFC640B9}" type="datetimeFigureOut">
               <a:rPr lang="en-FI" smtClean="0"/>
-              <a:t>09/05/2022</a:t>
+              <a:t>03/24/2024</a:t>
             </a:fld>
             <a:endParaRPr lang="en-FI"/>
           </a:p>
@@ -1606,7 +1606,7 @@
           <a:p>
             <a:fld id="{3AEECB1E-8F43-4310-8D22-D4EEFFC640B9}" type="datetimeFigureOut">
               <a:rPr lang="en-FI" smtClean="0"/>
-              <a:t>09/05/2022</a:t>
+              <a:t>03/24/2024</a:t>
             </a:fld>
             <a:endParaRPr lang="en-FI"/>
           </a:p>
@@ -1724,7 +1724,7 @@
           <a:p>
             <a:fld id="{3AEECB1E-8F43-4310-8D22-D4EEFFC640B9}" type="datetimeFigureOut">
               <a:rPr lang="en-FI" smtClean="0"/>
-              <a:t>09/05/2022</a:t>
+              <a:t>03/24/2024</a:t>
             </a:fld>
             <a:endParaRPr lang="en-FI"/>
           </a:p>
@@ -1819,7 +1819,7 @@
           <a:p>
             <a:fld id="{3AEECB1E-8F43-4310-8D22-D4EEFFC640B9}" type="datetimeFigureOut">
               <a:rPr lang="en-FI" smtClean="0"/>
-              <a:t>09/05/2022</a:t>
+              <a:t>03/24/2024</a:t>
             </a:fld>
             <a:endParaRPr lang="en-FI"/>
           </a:p>
@@ -2096,7 +2096,7 @@
           <a:p>
             <a:fld id="{3AEECB1E-8F43-4310-8D22-D4EEFFC640B9}" type="datetimeFigureOut">
               <a:rPr lang="en-FI" smtClean="0"/>
-              <a:t>09/05/2022</a:t>
+              <a:t>03/24/2024</a:t>
             </a:fld>
             <a:endParaRPr lang="en-FI"/>
           </a:p>
@@ -2353,7 +2353,7 @@
           <a:p>
             <a:fld id="{3AEECB1E-8F43-4310-8D22-D4EEFFC640B9}" type="datetimeFigureOut">
               <a:rPr lang="en-FI" smtClean="0"/>
-              <a:t>09/05/2022</a:t>
+              <a:t>03/24/2024</a:t>
             </a:fld>
             <a:endParaRPr lang="en-FI"/>
           </a:p>
@@ -2566,7 +2566,7 @@
           <a:p>
             <a:fld id="{3AEECB1E-8F43-4310-8D22-D4EEFFC640B9}" type="datetimeFigureOut">
               <a:rPr lang="en-FI" smtClean="0"/>
-              <a:t>09/05/2022</a:t>
+              <a:t>03/24/2024</a:t>
             </a:fld>
             <a:endParaRPr lang="en-FI"/>
           </a:p>
@@ -3323,7 +3323,7 @@
         </p:blipFill>
         <p:spPr>
           <a:xfrm>
-            <a:off x="6818592" y="63187"/>
+            <a:off x="6813687" y="62606"/>
             <a:ext cx="1269219" cy="4365990"/>
           </a:xfrm>
           <a:prstGeom prst="rect">
@@ -3622,6 +3622,101 @@
               </a:schemeClr>
             </a:solidFill>
           </a:ln>
+        </p:spPr>
+      </p:pic>
+      <p:pic>
+        <p:nvPicPr>
+          <p:cNvPr id="4" name="Picture 3" descr="A screenshot of a phone&#10;&#10;Description automatically generated">
+            <a:extLst>
+              <a:ext uri="{FF2B5EF4-FFF2-40B4-BE49-F238E27FC236}">
+                <a16:creationId xmlns:a16="http://schemas.microsoft.com/office/drawing/2014/main" id="{2961F41C-7D71-4076-20AC-3DC43A05930F}"/>
+              </a:ext>
+            </a:extLst>
+          </p:cNvPr>
+          <p:cNvPicPr>
+            <a:picLocks noChangeAspect="1"/>
+          </p:cNvPicPr>
+          <p:nvPr/>
+        </p:nvPicPr>
+        <p:blipFill rotWithShape="1">
+          <a:blip r:embed="rId20">
+            <a:extLst>
+              <a:ext uri="{28A0092B-C50C-407E-A947-70E740481C1C}">
+                <a14:useLocalDpi xmlns:a14="http://schemas.microsoft.com/office/drawing/2010/main" val="0"/>
+              </a:ext>
+            </a:extLst>
+          </a:blip>
+          <a:srcRect l="2728" t="1466" r="39405" b="3433"/>
+          <a:stretch/>
+        </p:blipFill>
+        <p:spPr>
+          <a:xfrm>
+            <a:off x="11353055" y="4428596"/>
+            <a:ext cx="1806096" cy="2434316"/>
+          </a:xfrm>
+          <a:prstGeom prst="rect">
+            <a:avLst/>
+          </a:prstGeom>
+        </p:spPr>
+      </p:pic>
+      <p:pic>
+        <p:nvPicPr>
+          <p:cNvPr id="12" name="Picture 11">
+            <a:extLst>
+              <a:ext uri="{FF2B5EF4-FFF2-40B4-BE49-F238E27FC236}">
+                <a16:creationId xmlns:a16="http://schemas.microsoft.com/office/drawing/2014/main" id="{C021EF5D-96E5-464B-1E83-2575BDC715DA}"/>
+              </a:ext>
+            </a:extLst>
+          </p:cNvPr>
+          <p:cNvPicPr>
+            <a:picLocks noChangeAspect="1"/>
+          </p:cNvPicPr>
+          <p:nvPr/>
+        </p:nvPicPr>
+        <p:blipFill>
+          <a:blip r:embed="rId21"/>
+          <a:stretch>
+            <a:fillRect/>
+          </a:stretch>
+        </p:blipFill>
+        <p:spPr>
+          <a:xfrm>
+            <a:off x="1330694" y="6461471"/>
+            <a:ext cx="2310472" cy="903711"/>
+          </a:xfrm>
+          <a:prstGeom prst="rect">
+            <a:avLst/>
+          </a:prstGeom>
+        </p:spPr>
+      </p:pic>
+      <p:pic>
+        <p:nvPicPr>
+          <p:cNvPr id="16" name="Picture 15">
+            <a:extLst>
+              <a:ext uri="{FF2B5EF4-FFF2-40B4-BE49-F238E27FC236}">
+                <a16:creationId xmlns:a16="http://schemas.microsoft.com/office/drawing/2014/main" id="{D08EDD1D-B4D6-5A4B-52FC-23FEB9FB63A1}"/>
+              </a:ext>
+            </a:extLst>
+          </p:cNvPr>
+          <p:cNvPicPr>
+            <a:picLocks noChangeAspect="1"/>
+          </p:cNvPicPr>
+          <p:nvPr/>
+        </p:nvPicPr>
+        <p:blipFill>
+          <a:blip r:embed="rId22"/>
+          <a:stretch>
+            <a:fillRect/>
+          </a:stretch>
+        </p:blipFill>
+        <p:spPr>
+          <a:xfrm>
+            <a:off x="9496103" y="6084405"/>
+            <a:ext cx="1774131" cy="1467533"/>
+          </a:xfrm>
+          <a:prstGeom prst="rect">
+            <a:avLst/>
+          </a:prstGeom>
         </p:spPr>
       </p:pic>
     </p:spTree>

</xml_diff>